<commit_message>
1. Updated gtube development document.
</commit_message>
<xml_diff>
--- a/gtube-development/figures/Diagrams.pptx
+++ b/gtube-development/figures/Diagrams.pptx
@@ -289,7 +289,8 @@
           <a:p>
             <a:fld id="{B0FD5A88-CC59-BB42-B4D1-739EC8275BA3}" type="datetimeFigureOut">
               <a:rPr lang="en-US" smtClean="0"/>
-              <a:t>8/3/10</a:t>
+              <a:pPr/>
+              <a:t>8/4/10</a:t>
             </a:fld>
             <a:endParaRPr lang="en-US"/>
           </a:p>
@@ -331,6 +332,7 @@
           <a:p>
             <a:fld id="{654B4567-9848-E847-B64D-0C1B7D9C6482}" type="slidenum">
               <a:rPr lang="en-US" smtClean="0"/>
+              <a:pPr/>
               <a:t>‹#›</a:t>
             </a:fld>
             <a:endParaRPr lang="en-US"/>
@@ -454,7 +456,8 @@
           <a:p>
             <a:fld id="{B0FD5A88-CC59-BB42-B4D1-739EC8275BA3}" type="datetimeFigureOut">
               <a:rPr lang="en-US" smtClean="0"/>
-              <a:t>8/3/10</a:t>
+              <a:pPr/>
+              <a:t>8/4/10</a:t>
             </a:fld>
             <a:endParaRPr lang="en-US"/>
           </a:p>
@@ -496,6 +499,7 @@
           <a:p>
             <a:fld id="{654B4567-9848-E847-B64D-0C1B7D9C6482}" type="slidenum">
               <a:rPr lang="en-US" smtClean="0"/>
+              <a:pPr/>
               <a:t>‹#›</a:t>
             </a:fld>
             <a:endParaRPr lang="en-US"/>
@@ -629,7 +633,8 @@
           <a:p>
             <a:fld id="{B0FD5A88-CC59-BB42-B4D1-739EC8275BA3}" type="datetimeFigureOut">
               <a:rPr lang="en-US" smtClean="0"/>
-              <a:t>8/3/10</a:t>
+              <a:pPr/>
+              <a:t>8/4/10</a:t>
             </a:fld>
             <a:endParaRPr lang="en-US"/>
           </a:p>
@@ -671,6 +676,7 @@
           <a:p>
             <a:fld id="{654B4567-9848-E847-B64D-0C1B7D9C6482}" type="slidenum">
               <a:rPr lang="en-US" smtClean="0"/>
+              <a:pPr/>
               <a:t>‹#›</a:t>
             </a:fld>
             <a:endParaRPr lang="en-US"/>
@@ -794,7 +800,8 @@
           <a:p>
             <a:fld id="{B0FD5A88-CC59-BB42-B4D1-739EC8275BA3}" type="datetimeFigureOut">
               <a:rPr lang="en-US" smtClean="0"/>
-              <a:t>8/3/10</a:t>
+              <a:pPr/>
+              <a:t>8/4/10</a:t>
             </a:fld>
             <a:endParaRPr lang="en-US"/>
           </a:p>
@@ -836,6 +843,7 @@
           <a:p>
             <a:fld id="{654B4567-9848-E847-B64D-0C1B7D9C6482}" type="slidenum">
               <a:rPr lang="en-US" smtClean="0"/>
+              <a:pPr/>
               <a:t>‹#›</a:t>
             </a:fld>
             <a:endParaRPr lang="en-US"/>
@@ -1035,7 +1043,8 @@
           <a:p>
             <a:fld id="{B0FD5A88-CC59-BB42-B4D1-739EC8275BA3}" type="datetimeFigureOut">
               <a:rPr lang="en-US" smtClean="0"/>
-              <a:t>8/3/10</a:t>
+              <a:pPr/>
+              <a:t>8/4/10</a:t>
             </a:fld>
             <a:endParaRPr lang="en-US"/>
           </a:p>
@@ -1077,6 +1086,7 @@
           <a:p>
             <a:fld id="{654B4567-9848-E847-B64D-0C1B7D9C6482}" type="slidenum">
               <a:rPr lang="en-US" smtClean="0"/>
+              <a:pPr/>
               <a:t>‹#›</a:t>
             </a:fld>
             <a:endParaRPr lang="en-US"/>
@@ -1318,7 +1328,8 @@
           <a:p>
             <a:fld id="{B0FD5A88-CC59-BB42-B4D1-739EC8275BA3}" type="datetimeFigureOut">
               <a:rPr lang="en-US" smtClean="0"/>
-              <a:t>8/3/10</a:t>
+              <a:pPr/>
+              <a:t>8/4/10</a:t>
             </a:fld>
             <a:endParaRPr lang="en-US"/>
           </a:p>
@@ -1360,6 +1371,7 @@
           <a:p>
             <a:fld id="{654B4567-9848-E847-B64D-0C1B7D9C6482}" type="slidenum">
               <a:rPr lang="en-US" smtClean="0"/>
+              <a:pPr/>
               <a:t>‹#›</a:t>
             </a:fld>
             <a:endParaRPr lang="en-US"/>
@@ -1735,7 +1747,8 @@
           <a:p>
             <a:fld id="{B0FD5A88-CC59-BB42-B4D1-739EC8275BA3}" type="datetimeFigureOut">
               <a:rPr lang="en-US" smtClean="0"/>
-              <a:t>8/3/10</a:t>
+              <a:pPr/>
+              <a:t>8/4/10</a:t>
             </a:fld>
             <a:endParaRPr lang="en-US"/>
           </a:p>
@@ -1777,6 +1790,7 @@
           <a:p>
             <a:fld id="{654B4567-9848-E847-B64D-0C1B7D9C6482}" type="slidenum">
               <a:rPr lang="en-US" smtClean="0"/>
+              <a:pPr/>
               <a:t>‹#›</a:t>
             </a:fld>
             <a:endParaRPr lang="en-US"/>
@@ -1848,7 +1862,8 @@
           <a:p>
             <a:fld id="{B0FD5A88-CC59-BB42-B4D1-739EC8275BA3}" type="datetimeFigureOut">
               <a:rPr lang="en-US" smtClean="0"/>
-              <a:t>8/3/10</a:t>
+              <a:pPr/>
+              <a:t>8/4/10</a:t>
             </a:fld>
             <a:endParaRPr lang="en-US"/>
           </a:p>
@@ -1890,6 +1905,7 @@
           <a:p>
             <a:fld id="{654B4567-9848-E847-B64D-0C1B7D9C6482}" type="slidenum">
               <a:rPr lang="en-US" smtClean="0"/>
+              <a:pPr/>
               <a:t>‹#›</a:t>
             </a:fld>
             <a:endParaRPr lang="en-US"/>
@@ -1938,7 +1954,8 @@
           <a:p>
             <a:fld id="{B0FD5A88-CC59-BB42-B4D1-739EC8275BA3}" type="datetimeFigureOut">
               <a:rPr lang="en-US" smtClean="0"/>
-              <a:t>8/3/10</a:t>
+              <a:pPr/>
+              <a:t>8/4/10</a:t>
             </a:fld>
             <a:endParaRPr lang="en-US"/>
           </a:p>
@@ -1980,6 +1997,7 @@
           <a:p>
             <a:fld id="{654B4567-9848-E847-B64D-0C1B7D9C6482}" type="slidenum">
               <a:rPr lang="en-US" smtClean="0"/>
+              <a:pPr/>
               <a:t>‹#›</a:t>
             </a:fld>
             <a:endParaRPr lang="en-US"/>
@@ -2210,7 +2228,8 @@
           <a:p>
             <a:fld id="{B0FD5A88-CC59-BB42-B4D1-739EC8275BA3}" type="datetimeFigureOut">
               <a:rPr lang="en-US" smtClean="0"/>
-              <a:t>8/3/10</a:t>
+              <a:pPr/>
+              <a:t>8/4/10</a:t>
             </a:fld>
             <a:endParaRPr lang="en-US"/>
           </a:p>
@@ -2252,6 +2271,7 @@
           <a:p>
             <a:fld id="{654B4567-9848-E847-B64D-0C1B7D9C6482}" type="slidenum">
               <a:rPr lang="en-US" smtClean="0"/>
+              <a:pPr/>
               <a:t>‹#›</a:t>
             </a:fld>
             <a:endParaRPr lang="en-US"/>
@@ -2458,7 +2478,8 @@
           <a:p>
             <a:fld id="{B0FD5A88-CC59-BB42-B4D1-739EC8275BA3}" type="datetimeFigureOut">
               <a:rPr lang="en-US" smtClean="0"/>
-              <a:t>8/3/10</a:t>
+              <a:pPr/>
+              <a:t>8/4/10</a:t>
             </a:fld>
             <a:endParaRPr lang="en-US"/>
           </a:p>
@@ -2500,6 +2521,7 @@
           <a:p>
             <a:fld id="{654B4567-9848-E847-B64D-0C1B7D9C6482}" type="slidenum">
               <a:rPr lang="en-US" smtClean="0"/>
+              <a:pPr/>
               <a:t>‹#›</a:t>
             </a:fld>
             <a:endParaRPr lang="en-US"/>
@@ -2666,7 +2688,8 @@
           <a:p>
             <a:fld id="{B0FD5A88-CC59-BB42-B4D1-739EC8275BA3}" type="datetimeFigureOut">
               <a:rPr lang="en-US" smtClean="0"/>
-              <a:t>8/3/10</a:t>
+              <a:pPr/>
+              <a:t>8/4/10</a:t>
             </a:fld>
             <a:endParaRPr lang="en-US"/>
           </a:p>
@@ -2744,6 +2767,7 @@
           <a:p>
             <a:fld id="{654B4567-9848-E847-B64D-0C1B7D9C6482}" type="slidenum">
               <a:rPr lang="en-US" smtClean="0"/>
+              <a:pPr/>
               <a:t>‹#›</a:t>
             </a:fld>
             <a:endParaRPr lang="en-US"/>
@@ -3102,8 +3126,8 @@
         </p:nvSpPr>
         <p:spPr>
           <a:xfrm>
-            <a:off x="3731211" y="1101327"/>
-            <a:ext cx="1247490" cy="1067612"/>
+            <a:off x="3731211" y="1121516"/>
+            <a:ext cx="1233558" cy="923717"/>
           </a:xfrm>
           <a:prstGeom prst="ellipse">
             <a:avLst/>
@@ -3160,7 +3184,7 @@
         </p:nvSpPr>
         <p:spPr>
           <a:xfrm>
-            <a:off x="3860457" y="2449888"/>
+            <a:off x="3860457" y="2169490"/>
             <a:ext cx="977766" cy="815444"/>
           </a:xfrm>
           <a:prstGeom prst="ellipse">
@@ -3221,8 +3245,8 @@
         </p:nvCxnSpPr>
         <p:spPr>
           <a:xfrm rot="16200000" flipH="1">
-            <a:off x="4260836" y="1007207"/>
-            <a:ext cx="179810" cy="8430"/>
+            <a:off x="4247259" y="1020784"/>
+            <a:ext cx="199999" cy="1464"/>
           </a:xfrm>
           <a:prstGeom prst="line">
             <a:avLst/>
@@ -3253,9 +3277,9 @@
           <p:nvPr/>
         </p:nvCxnSpPr>
         <p:spPr>
-          <a:xfrm rot="5400000">
-            <a:off x="4211674" y="2306605"/>
-            <a:ext cx="280949" cy="5616"/>
+          <a:xfrm rot="16200000" flipH="1">
+            <a:off x="4286537" y="2106686"/>
+            <a:ext cx="124257" cy="1350"/>
           </a:xfrm>
           <a:prstGeom prst="line">
             <a:avLst/>
@@ -3342,7 +3366,7 @@
         </p:nvSpPr>
         <p:spPr>
           <a:xfrm>
-            <a:off x="2652306" y="3613711"/>
+            <a:off x="3731211" y="3118897"/>
             <a:ext cx="1247490" cy="1067612"/>
           </a:xfrm>
           <a:prstGeom prst="ellipse">
@@ -3400,7 +3424,7 @@
         </p:nvSpPr>
         <p:spPr>
           <a:xfrm>
-            <a:off x="4821355" y="3613711"/>
+            <a:off x="5456668" y="3786892"/>
             <a:ext cx="1247490" cy="1067612"/>
           </a:xfrm>
           <a:prstGeom prst="ellipse">
@@ -3435,14 +3459,22 @@
           <a:p>
             <a:pPr algn="ctr"/>
             <a:r>
-              <a:rPr lang="en-US" sz="1200" dirty="0" smtClean="0">
+              <a:rPr lang="en-US" sz="1100" dirty="0" smtClean="0">
                 <a:solidFill>
                   <a:schemeClr val="tx1"/>
                 </a:solidFill>
               </a:rPr>
-              <a:t>Publication Manager</a:t>
-            </a:r>
-            <a:endParaRPr lang="en-US" sz="1200" dirty="0">
+              <a:t>Manuscript </a:t>
+            </a:r>
+            <a:r>
+              <a:rPr lang="en-US" sz="1100" dirty="0" smtClean="0">
+                <a:solidFill>
+                  <a:schemeClr val="tx1"/>
+                </a:solidFill>
+              </a:rPr>
+              <a:t>Manager</a:t>
+            </a:r>
+            <a:endParaRPr lang="en-US" sz="1100" dirty="0">
               <a:solidFill>
                 <a:schemeClr val="tx1"/>
               </a:solidFill>
@@ -3458,7 +3490,7 @@
         </p:nvSpPr>
         <p:spPr>
           <a:xfrm>
-            <a:off x="6828119" y="3613711"/>
+            <a:off x="7076045" y="3795138"/>
             <a:ext cx="1247490" cy="1067612"/>
           </a:xfrm>
           <a:prstGeom prst="ellipse">
@@ -3512,20 +3544,18 @@
         <p:nvCxnSpPr>
           <p:cNvPr id="23" name="Elbow Connector 22"/>
           <p:cNvCxnSpPr>
-            <a:stCxn id="7" idx="4"/>
+            <a:stCxn id="7" idx="2"/>
             <a:endCxn id="15" idx="0"/>
           </p:cNvCxnSpPr>
           <p:nvPr/>
         </p:nvCxnSpPr>
         <p:spPr>
-          <a:xfrm rot="5400000">
-            <a:off x="2599275" y="1863645"/>
-            <a:ext cx="348379" cy="3151752"/>
+          <a:xfrm rot="10800000" flipV="1">
+            <a:off x="1197589" y="2577211"/>
+            <a:ext cx="2662869" cy="1036499"/>
           </a:xfrm>
-          <a:prstGeom prst="bentConnector3">
-            <a:avLst>
-              <a:gd name="adj1" fmla="val 50000"/>
-            </a:avLst>
+          <a:prstGeom prst="bentConnector2">
+            <a:avLst/>
           </a:prstGeom>
         </p:spPr>
         <p:style>
@@ -3553,79 +3583,9 @@
           <p:nvPr/>
         </p:nvCxnSpPr>
         <p:spPr>
-          <a:xfrm rot="5400000">
-            <a:off x="3638507" y="2902877"/>
-            <a:ext cx="348379" cy="1073289"/>
-          </a:xfrm>
-          <a:prstGeom prst="bentConnector3">
-            <a:avLst>
-              <a:gd name="adj1" fmla="val 50000"/>
-            </a:avLst>
-          </a:prstGeom>
-        </p:spPr>
-        <p:style>
-          <a:lnRef idx="2">
-            <a:schemeClr val="accent1"/>
-          </a:lnRef>
-          <a:fillRef idx="0">
-            <a:schemeClr val="accent1"/>
-          </a:fillRef>
-          <a:effectRef idx="1">
-            <a:schemeClr val="accent1"/>
-          </a:effectRef>
-          <a:fontRef idx="minor">
-            <a:schemeClr val="tx1"/>
-          </a:fontRef>
-        </p:style>
-      </p:cxnSp>
-      <p:cxnSp>
-        <p:nvCxnSpPr>
-          <p:cNvPr id="29" name="Elbow Connector 28"/>
-          <p:cNvCxnSpPr>
-            <a:stCxn id="7" idx="4"/>
-            <a:endCxn id="17" idx="0"/>
-          </p:cNvCxnSpPr>
-          <p:nvPr/>
-        </p:nvCxnSpPr>
-        <p:spPr>
           <a:xfrm rot="16200000" flipH="1">
-            <a:off x="4723031" y="2891641"/>
-            <a:ext cx="348379" cy="1095760"/>
-          </a:xfrm>
-          <a:prstGeom prst="bentConnector3">
-            <a:avLst>
-              <a:gd name="adj1" fmla="val 50000"/>
-            </a:avLst>
-          </a:prstGeom>
-        </p:spPr>
-        <p:style>
-          <a:lnRef idx="2">
-            <a:schemeClr val="accent1"/>
-          </a:lnRef>
-          <a:fillRef idx="0">
-            <a:schemeClr val="accent1"/>
-          </a:fillRef>
-          <a:effectRef idx="1">
-            <a:schemeClr val="accent1"/>
-          </a:effectRef>
-          <a:fontRef idx="minor">
-            <a:schemeClr val="tx1"/>
-          </a:fontRef>
-        </p:style>
-      </p:cxnSp>
-      <p:cxnSp>
-        <p:nvCxnSpPr>
-          <p:cNvPr id="32" name="Elbow Connector 31"/>
-          <p:cNvCxnSpPr>
-            <a:stCxn id="7" idx="4"/>
-            <a:endCxn id="18" idx="0"/>
-          </p:cNvCxnSpPr>
-          <p:nvPr/>
-        </p:nvCxnSpPr>
-        <p:spPr>
-          <a:xfrm rot="16200000" flipH="1">
-            <a:off x="5726413" y="1888259"/>
-            <a:ext cx="348379" cy="3102524"/>
+            <a:off x="4285167" y="3049107"/>
+            <a:ext cx="133963" cy="5616"/>
           </a:xfrm>
           <a:prstGeom prst="bentConnector3">
             <a:avLst>
@@ -3714,7 +3674,7 @@
         </p:nvSpPr>
         <p:spPr>
           <a:xfrm>
-            <a:off x="2535389" y="5299412"/>
+            <a:off x="3607249" y="5293106"/>
             <a:ext cx="1495414" cy="899041"/>
           </a:xfrm>
           <a:prstGeom prst="roundRect">
@@ -3807,9 +3767,9 @@
           <p:nvPr/>
         </p:nvCxnSpPr>
         <p:spPr>
-          <a:xfrm rot="16200000" flipH="1">
-            <a:off x="2970529" y="4986844"/>
-            <a:ext cx="618089" cy="7045"/>
+          <a:xfrm rot="5400000">
+            <a:off x="3801658" y="4739807"/>
+            <a:ext cx="1106597" cy="1588"/>
           </a:xfrm>
           <a:prstGeom prst="line">
             <a:avLst/>
@@ -3838,7 +3798,7 @@
         </p:nvSpPr>
         <p:spPr>
           <a:xfrm>
-            <a:off x="4697394" y="5299412"/>
+            <a:off x="5332706" y="5293106"/>
             <a:ext cx="1495414" cy="899041"/>
           </a:xfrm>
           <a:prstGeom prst="roundRect">
@@ -3898,9 +3858,9 @@
           <p:nvPr/>
         </p:nvCxnSpPr>
         <p:spPr>
-          <a:xfrm rot="16200000" flipH="1">
-            <a:off x="5136056" y="4990366"/>
-            <a:ext cx="618089" cy="1"/>
+          <a:xfrm rot="5400000">
+            <a:off x="5861112" y="5073805"/>
+            <a:ext cx="438602" cy="1588"/>
           </a:xfrm>
           <a:prstGeom prst="line">
             <a:avLst/>
@@ -3929,7 +3889,7 @@
         </p:nvSpPr>
         <p:spPr>
           <a:xfrm>
-            <a:off x="6704158" y="5299412"/>
+            <a:off x="6952082" y="5299412"/>
             <a:ext cx="1495414" cy="899041"/>
           </a:xfrm>
           <a:prstGeom prst="roundRect">
@@ -3989,11 +3949,107 @@
           <p:nvPr/>
         </p:nvCxnSpPr>
         <p:spPr>
-          <a:xfrm rot="16200000" flipH="1">
-            <a:off x="7142820" y="4990366"/>
-            <a:ext cx="618089" cy="1"/>
+          <a:xfrm rot="5400000">
+            <a:off x="7481459" y="5081081"/>
+            <a:ext cx="436662" cy="1"/>
           </a:xfrm>
           <a:prstGeom prst="line">
+            <a:avLst/>
+          </a:prstGeom>
+        </p:spPr>
+        <p:style>
+          <a:lnRef idx="2">
+            <a:schemeClr val="accent1"/>
+          </a:lnRef>
+          <a:fillRef idx="0">
+            <a:schemeClr val="accent1"/>
+          </a:fillRef>
+          <a:effectRef idx="1">
+            <a:schemeClr val="accent1"/>
+          </a:effectRef>
+          <a:fontRef idx="minor">
+            <a:schemeClr val="tx1"/>
+          </a:fontRef>
+        </p:style>
+      </p:cxnSp>
+      <p:cxnSp>
+        <p:nvCxnSpPr>
+          <p:cNvPr id="25" name="Straight Connector 24"/>
+          <p:cNvCxnSpPr/>
+          <p:nvPr/>
+        </p:nvCxnSpPr>
+        <p:spPr>
+          <a:xfrm flipV="1">
+            <a:off x="321638" y="4964397"/>
+            <a:ext cx="8651234" cy="8246"/>
+          </a:xfrm>
+          <a:prstGeom prst="line">
+            <a:avLst/>
+          </a:prstGeom>
+        </p:spPr>
+        <p:style>
+          <a:lnRef idx="2">
+            <a:schemeClr val="accent1"/>
+          </a:lnRef>
+          <a:fillRef idx="0">
+            <a:schemeClr val="accent1"/>
+          </a:fillRef>
+          <a:effectRef idx="1">
+            <a:schemeClr val="accent1"/>
+          </a:effectRef>
+          <a:fontRef idx="minor">
+            <a:schemeClr val="tx1"/>
+          </a:fontRef>
+        </p:style>
+      </p:cxnSp>
+      <p:cxnSp>
+        <p:nvCxnSpPr>
+          <p:cNvPr id="63" name="Elbow Connector 62"/>
+          <p:cNvCxnSpPr>
+            <a:stCxn id="16" idx="6"/>
+            <a:endCxn id="17" idx="0"/>
+          </p:cNvCxnSpPr>
+          <p:nvPr/>
+        </p:nvCxnSpPr>
+        <p:spPr>
+          <a:xfrm>
+            <a:off x="4978701" y="3652703"/>
+            <a:ext cx="1101712" cy="134189"/>
+          </a:xfrm>
+          <a:prstGeom prst="bentConnector2">
+            <a:avLst/>
+          </a:prstGeom>
+        </p:spPr>
+        <p:style>
+          <a:lnRef idx="2">
+            <a:schemeClr val="accent1"/>
+          </a:lnRef>
+          <a:fillRef idx="0">
+            <a:schemeClr val="accent1"/>
+          </a:fillRef>
+          <a:effectRef idx="1">
+            <a:schemeClr val="accent1"/>
+          </a:effectRef>
+          <a:fontRef idx="minor">
+            <a:schemeClr val="tx1"/>
+          </a:fontRef>
+        </p:style>
+      </p:cxnSp>
+      <p:cxnSp>
+        <p:nvCxnSpPr>
+          <p:cNvPr id="66" name="Elbow Connector 65"/>
+          <p:cNvCxnSpPr>
+            <a:stCxn id="16" idx="6"/>
+            <a:endCxn id="18" idx="0"/>
+          </p:cNvCxnSpPr>
+          <p:nvPr/>
+        </p:nvCxnSpPr>
+        <p:spPr>
+          <a:xfrm>
+            <a:off x="4978701" y="3652703"/>
+            <a:ext cx="2721089" cy="142435"/>
+          </a:xfrm>
+          <a:prstGeom prst="bentConnector2">
             <a:avLst/>
           </a:prstGeom>
         </p:spPr>

</xml_diff>

<commit_message>
1. Updated the gtube technical specification.
</commit_message>
<xml_diff>
--- a/gtube-development/figures/Diagrams.pptx
+++ b/gtube-development/figures/Diagrams.pptx
@@ -290,7 +290,7 @@
             <a:fld id="{B0FD5A88-CC59-BB42-B4D1-739EC8275BA3}" type="datetimeFigureOut">
               <a:rPr lang="en-US" smtClean="0"/>
               <a:pPr/>
-              <a:t>8/4/10</a:t>
+              <a:t>8/5/10</a:t>
             </a:fld>
             <a:endParaRPr lang="en-US"/>
           </a:p>
@@ -457,7 +457,7 @@
             <a:fld id="{B0FD5A88-CC59-BB42-B4D1-739EC8275BA3}" type="datetimeFigureOut">
               <a:rPr lang="en-US" smtClean="0"/>
               <a:pPr/>
-              <a:t>8/4/10</a:t>
+              <a:t>8/5/10</a:t>
             </a:fld>
             <a:endParaRPr lang="en-US"/>
           </a:p>
@@ -634,7 +634,7 @@
             <a:fld id="{B0FD5A88-CC59-BB42-B4D1-739EC8275BA3}" type="datetimeFigureOut">
               <a:rPr lang="en-US" smtClean="0"/>
               <a:pPr/>
-              <a:t>8/4/10</a:t>
+              <a:t>8/5/10</a:t>
             </a:fld>
             <a:endParaRPr lang="en-US"/>
           </a:p>
@@ -801,7 +801,7 @@
             <a:fld id="{B0FD5A88-CC59-BB42-B4D1-739EC8275BA3}" type="datetimeFigureOut">
               <a:rPr lang="en-US" smtClean="0"/>
               <a:pPr/>
-              <a:t>8/4/10</a:t>
+              <a:t>8/5/10</a:t>
             </a:fld>
             <a:endParaRPr lang="en-US"/>
           </a:p>
@@ -1044,7 +1044,7 @@
             <a:fld id="{B0FD5A88-CC59-BB42-B4D1-739EC8275BA3}" type="datetimeFigureOut">
               <a:rPr lang="en-US" smtClean="0"/>
               <a:pPr/>
-              <a:t>8/4/10</a:t>
+              <a:t>8/5/10</a:t>
             </a:fld>
             <a:endParaRPr lang="en-US"/>
           </a:p>
@@ -1329,7 +1329,7 @@
             <a:fld id="{B0FD5A88-CC59-BB42-B4D1-739EC8275BA3}" type="datetimeFigureOut">
               <a:rPr lang="en-US" smtClean="0"/>
               <a:pPr/>
-              <a:t>8/4/10</a:t>
+              <a:t>8/5/10</a:t>
             </a:fld>
             <a:endParaRPr lang="en-US"/>
           </a:p>
@@ -1748,7 +1748,7 @@
             <a:fld id="{B0FD5A88-CC59-BB42-B4D1-739EC8275BA3}" type="datetimeFigureOut">
               <a:rPr lang="en-US" smtClean="0"/>
               <a:pPr/>
-              <a:t>8/4/10</a:t>
+              <a:t>8/5/10</a:t>
             </a:fld>
             <a:endParaRPr lang="en-US"/>
           </a:p>
@@ -1863,7 +1863,7 @@
             <a:fld id="{B0FD5A88-CC59-BB42-B4D1-739EC8275BA3}" type="datetimeFigureOut">
               <a:rPr lang="en-US" smtClean="0"/>
               <a:pPr/>
-              <a:t>8/4/10</a:t>
+              <a:t>8/5/10</a:t>
             </a:fld>
             <a:endParaRPr lang="en-US"/>
           </a:p>
@@ -1955,7 +1955,7 @@
             <a:fld id="{B0FD5A88-CC59-BB42-B4D1-739EC8275BA3}" type="datetimeFigureOut">
               <a:rPr lang="en-US" smtClean="0"/>
               <a:pPr/>
-              <a:t>8/4/10</a:t>
+              <a:t>8/5/10</a:t>
             </a:fld>
             <a:endParaRPr lang="en-US"/>
           </a:p>
@@ -2229,7 +2229,7 @@
             <a:fld id="{B0FD5A88-CC59-BB42-B4D1-739EC8275BA3}" type="datetimeFigureOut">
               <a:rPr lang="en-US" smtClean="0"/>
               <a:pPr/>
-              <a:t>8/4/10</a:t>
+              <a:t>8/5/10</a:t>
             </a:fld>
             <a:endParaRPr lang="en-US"/>
           </a:p>
@@ -2479,7 +2479,7 @@
             <a:fld id="{B0FD5A88-CC59-BB42-B4D1-739EC8275BA3}" type="datetimeFigureOut">
               <a:rPr lang="en-US" smtClean="0"/>
               <a:pPr/>
-              <a:t>8/4/10</a:t>
+              <a:t>8/5/10</a:t>
             </a:fld>
             <a:endParaRPr lang="en-US"/>
           </a:p>
@@ -2689,7 +2689,7 @@
             <a:fld id="{B0FD5A88-CC59-BB42-B4D1-739EC8275BA3}" type="datetimeFigureOut">
               <a:rPr lang="en-US" smtClean="0"/>
               <a:pPr/>
-              <a:t>8/4/10</a:t>
+              <a:t>8/5/10</a:t>
             </a:fld>
             <a:endParaRPr lang="en-US"/>
           </a:p>
@@ -3348,7 +3348,7 @@
                   <a:schemeClr val="tx1"/>
                 </a:solidFill>
               </a:rPr>
-              <a:t>Model Manager</a:t>
+              <a:t>G3 User Workflow Manager</a:t>
             </a:r>
             <a:endParaRPr lang="en-US" sz="1400" dirty="0">
               <a:solidFill>
@@ -3464,15 +3464,7 @@
                   <a:schemeClr val="tx1"/>
                 </a:solidFill>
               </a:rPr>
-              <a:t>Manuscript </a:t>
-            </a:r>
-            <a:r>
-              <a:rPr lang="en-US" sz="1100" dirty="0" smtClean="0">
-                <a:solidFill>
-                  <a:schemeClr val="tx1"/>
-                </a:solidFill>
-              </a:rPr>
-              <a:t>Manager</a:t>
+              <a:t>Manuscript Manager</a:t>
             </a:r>
             <a:endParaRPr lang="en-US" sz="1100" dirty="0">
               <a:solidFill>
@@ -3656,7 +3648,47 @@
                   <a:schemeClr val="tx1"/>
                 </a:solidFill>
               </a:rPr>
-              <a:t>Lower Level Model Operations </a:t>
+              <a:t>Lower </a:t>
+            </a:r>
+            <a:r>
+              <a:rPr lang="en-US" sz="1200" dirty="0" smtClean="0">
+                <a:solidFill>
+                  <a:schemeClr val="tx1"/>
+                </a:solidFill>
+              </a:rPr>
+              <a:t>Leve</a:t>
+            </a:r>
+            <a:r>
+              <a:rPr lang="en-US" sz="1200" dirty="0" smtClean="0">
+                <a:solidFill>
+                  <a:schemeClr val="tx1"/>
+                </a:solidFill>
+              </a:rPr>
+              <a:t>l </a:t>
+            </a:r>
+            <a:r>
+              <a:rPr lang="en-US" sz="1200" smtClean="0">
+                <a:solidFill>
+                  <a:schemeClr val="tx1"/>
+                </a:solidFill>
+              </a:rPr>
+              <a:t>User Workflow</a:t>
+            </a:r>
+            <a:r>
+              <a:rPr lang="en-US" sz="1200" smtClean="0">
+                <a:solidFill>
+                  <a:schemeClr val="tx1"/>
+                </a:solidFill>
+              </a:rPr>
+              <a:t> </a:t>
+            </a:r>
+            <a:r>
+              <a:rPr lang="en-US" sz="1200" dirty="0" smtClean="0">
+                <a:solidFill>
+                  <a:schemeClr val="tx1"/>
+                </a:solidFill>
+              </a:rPr>
+              <a:t>Operations </a:t>
             </a:r>
             <a:endParaRPr lang="en-US" sz="1200" dirty="0">
               <a:solidFill>

</xml_diff>